<commit_message>
Placeholders for labs 6-13
</commit_message>
<xml_diff>
--- a/slides/k8s-101.pptx
+++ b/slides/k8s-101.pptx
@@ -246,7 +246,7 @@
           <a:p>
             <a:fld id="{11837477-D453-41A7-B038-AF1F6C7EED11}" type="datetimeFigureOut">
               <a:rPr lang="en-US" smtClean="0"/>
-              <a:t>6/8/2022</a:t>
+              <a:t>6/15/2022</a:t>
             </a:fld>
             <a:endParaRPr lang="en-US"/>
           </a:p>
@@ -7647,7 +7647,7 @@
           <a:p>
             <a:fld id="{CE88D40F-0E01-46E3-A0A3-09B1E418DDBF}" type="datetimeFigureOut">
               <a:rPr lang="en-US" smtClean="0"/>
-              <a:t>6/8/2022</a:t>
+              <a:t>6/15/2022</a:t>
             </a:fld>
             <a:endParaRPr lang="en-US"/>
           </a:p>
@@ -7845,7 +7845,7 @@
           <a:p>
             <a:fld id="{CE88D40F-0E01-46E3-A0A3-09B1E418DDBF}" type="datetimeFigureOut">
               <a:rPr lang="en-US" smtClean="0"/>
-              <a:t>6/8/2022</a:t>
+              <a:t>6/15/2022</a:t>
             </a:fld>
             <a:endParaRPr lang="en-US"/>
           </a:p>
@@ -8053,7 +8053,7 @@
           <a:p>
             <a:fld id="{CE88D40F-0E01-46E3-A0A3-09B1E418DDBF}" type="datetimeFigureOut">
               <a:rPr lang="en-US" smtClean="0"/>
-              <a:t>6/8/2022</a:t>
+              <a:t>6/15/2022</a:t>
             </a:fld>
             <a:endParaRPr lang="en-US"/>
           </a:p>
@@ -8610,7 +8610,7 @@
           <a:p>
             <a:fld id="{CE88D40F-0E01-46E3-A0A3-09B1E418DDBF}" type="datetimeFigureOut">
               <a:rPr lang="en-US" smtClean="0"/>
-              <a:t>6/8/2022</a:t>
+              <a:t>6/15/2022</a:t>
             </a:fld>
             <a:endParaRPr lang="en-US"/>
           </a:p>
@@ -8885,7 +8885,7 @@
           <a:p>
             <a:fld id="{CE88D40F-0E01-46E3-A0A3-09B1E418DDBF}" type="datetimeFigureOut">
               <a:rPr lang="en-US" smtClean="0"/>
-              <a:t>6/8/2022</a:t>
+              <a:t>6/15/2022</a:t>
             </a:fld>
             <a:endParaRPr lang="en-US"/>
           </a:p>
@@ -9150,7 +9150,7 @@
           <a:p>
             <a:fld id="{CE88D40F-0E01-46E3-A0A3-09B1E418DDBF}" type="datetimeFigureOut">
               <a:rPr lang="en-US" smtClean="0"/>
-              <a:t>6/8/2022</a:t>
+              <a:t>6/15/2022</a:t>
             </a:fld>
             <a:endParaRPr lang="en-US"/>
           </a:p>
@@ -9562,7 +9562,7 @@
           <a:p>
             <a:fld id="{CE88D40F-0E01-46E3-A0A3-09B1E418DDBF}" type="datetimeFigureOut">
               <a:rPr lang="en-US" smtClean="0"/>
-              <a:t>6/8/2022</a:t>
+              <a:t>6/15/2022</a:t>
             </a:fld>
             <a:endParaRPr lang="en-US"/>
           </a:p>
@@ -9703,7 +9703,7 @@
           <a:p>
             <a:fld id="{CE88D40F-0E01-46E3-A0A3-09B1E418DDBF}" type="datetimeFigureOut">
               <a:rPr lang="en-US" smtClean="0"/>
-              <a:t>6/8/2022</a:t>
+              <a:t>6/15/2022</a:t>
             </a:fld>
             <a:endParaRPr lang="en-US"/>
           </a:p>
@@ -9816,7 +9816,7 @@
           <a:p>
             <a:fld id="{CE88D40F-0E01-46E3-A0A3-09B1E418DDBF}" type="datetimeFigureOut">
               <a:rPr lang="en-US" smtClean="0"/>
-              <a:t>6/8/2022</a:t>
+              <a:t>6/15/2022</a:t>
             </a:fld>
             <a:endParaRPr lang="en-US"/>
           </a:p>
@@ -10127,7 +10127,7 @@
           <a:p>
             <a:fld id="{CE88D40F-0E01-46E3-A0A3-09B1E418DDBF}" type="datetimeFigureOut">
               <a:rPr lang="en-US" smtClean="0"/>
-              <a:t>6/8/2022</a:t>
+              <a:t>6/15/2022</a:t>
             </a:fld>
             <a:endParaRPr lang="en-US"/>
           </a:p>
@@ -10415,7 +10415,7 @@
           <a:p>
             <a:fld id="{CE88D40F-0E01-46E3-A0A3-09B1E418DDBF}" type="datetimeFigureOut">
               <a:rPr lang="en-US" smtClean="0"/>
-              <a:t>6/8/2022</a:t>
+              <a:t>6/15/2022</a:t>
             </a:fld>
             <a:endParaRPr lang="en-US"/>
           </a:p>
@@ -10656,7 +10656,7 @@
           <a:p>
             <a:fld id="{CE88D40F-0E01-46E3-A0A3-09B1E418DDBF}" type="datetimeFigureOut">
               <a:rPr lang="en-US" smtClean="0"/>
-              <a:t>6/8/2022</a:t>
+              <a:t>6/15/2022</a:t>
             </a:fld>
             <a:endParaRPr lang="en-US"/>
           </a:p>
@@ -18728,7 +18728,7 @@
 </file>
 
 <file path=ppt/slides/slide20.xml><?xml version="1.0" encoding="utf-8"?>
-<p:sld xmlns:a="http://schemas.openxmlformats.org/drawingml/2006/main" xmlns:r="http://schemas.openxmlformats.org/officeDocument/2006/relationships" xmlns:p="http://schemas.openxmlformats.org/presentationml/2006/main">
+<p:sld xmlns:a="http://schemas.openxmlformats.org/drawingml/2006/main" xmlns:r="http://schemas.openxmlformats.org/officeDocument/2006/relationships" xmlns:p="http://schemas.openxmlformats.org/presentationml/2006/main" show="0">
   <p:cSld>
     <p:spTree>
       <p:nvGrpSpPr>

</xml_diff>